<commit_message>
UI improvements: new icon, narrower edit boxes, smaller labels
</commit_message>
<xml_diff>
--- a/features/dev_florian/resources/Icons.pptx
+++ b/features/dev_florian/resources/Icons.pptx
@@ -97,14 +97,16 @@
     <p:sldId id="341" r:id="rId91"/>
     <p:sldId id="340" r:id="rId92"/>
     <p:sldId id="342" r:id="rId93"/>
-    <p:sldId id="343" r:id="rId94"/>
+    <p:sldId id="355" r:id="rId94"/>
     <p:sldId id="344" r:id="rId95"/>
-    <p:sldId id="345" r:id="rId96"/>
+    <p:sldId id="357" r:id="rId96"/>
+    <p:sldId id="356" r:id="rId97"/>
+    <p:sldId id="345" r:id="rId98"/>
   </p:sldIdLst>
   <p:sldSz cx="7199313" cy="7199313"/>
   <p:notesSz cx="6858000" cy="9144000"/>
   <p:custDataLst>
-    <p:tags r:id="rId97"/>
+    <p:tags r:id="rId99"/>
   </p:custDataLst>
   <p:defaultTextStyle>
     <a:defPPr>
@@ -400,7 +402,7 @@
           <a:p>
             <a:fld id="{311EFB77-D67C-4B41-8660-F7D06438CC8C}" type="datetimeFigureOut">
               <a:rPr lang="de-DE" smtClean="0"/>
-              <a:t>11.12.2022</a:t>
+              <a:t>24.01.2025</a:t>
             </a:fld>
             <a:endParaRPr lang="de-DE"/>
           </a:p>
@@ -570,7 +572,7 @@
           <a:p>
             <a:fld id="{311EFB77-D67C-4B41-8660-F7D06438CC8C}" type="datetimeFigureOut">
               <a:rPr lang="de-DE" smtClean="0"/>
-              <a:t>11.12.2022</a:t>
+              <a:t>24.01.2025</a:t>
             </a:fld>
             <a:endParaRPr lang="de-DE"/>
           </a:p>
@@ -750,7 +752,7 @@
           <a:p>
             <a:fld id="{311EFB77-D67C-4B41-8660-F7D06438CC8C}" type="datetimeFigureOut">
               <a:rPr lang="de-DE" smtClean="0"/>
-              <a:t>11.12.2022</a:t>
+              <a:t>24.01.2025</a:t>
             </a:fld>
             <a:endParaRPr lang="de-DE"/>
           </a:p>
@@ -980,7 +982,7 @@
           <a:p>
             <a:fld id="{311EFB77-D67C-4B41-8660-F7D06438CC8C}" type="datetimeFigureOut">
               <a:rPr lang="de-DE" smtClean="0"/>
-              <a:t>11.12.2022</a:t>
+              <a:t>24.01.2025</a:t>
             </a:fld>
             <a:endParaRPr lang="de-DE"/>
           </a:p>
@@ -1224,7 +1226,7 @@
           <a:p>
             <a:fld id="{311EFB77-D67C-4B41-8660-F7D06438CC8C}" type="datetimeFigureOut">
               <a:rPr lang="de-DE" smtClean="0"/>
-              <a:t>11.12.2022</a:t>
+              <a:t>24.01.2025</a:t>
             </a:fld>
             <a:endParaRPr lang="de-DE"/>
           </a:p>
@@ -1456,7 +1458,7 @@
           <a:p>
             <a:fld id="{311EFB77-D67C-4B41-8660-F7D06438CC8C}" type="datetimeFigureOut">
               <a:rPr lang="de-DE" smtClean="0"/>
-              <a:t>11.12.2022</a:t>
+              <a:t>24.01.2025</a:t>
             </a:fld>
             <a:endParaRPr lang="de-DE"/>
           </a:p>
@@ -1823,7 +1825,7 @@
           <a:p>
             <a:fld id="{311EFB77-D67C-4B41-8660-F7D06438CC8C}" type="datetimeFigureOut">
               <a:rPr lang="de-DE" smtClean="0"/>
-              <a:t>11.12.2022</a:t>
+              <a:t>24.01.2025</a:t>
             </a:fld>
             <a:endParaRPr lang="de-DE"/>
           </a:p>
@@ -1941,7 +1943,7 @@
           <a:p>
             <a:fld id="{311EFB77-D67C-4B41-8660-F7D06438CC8C}" type="datetimeFigureOut">
               <a:rPr lang="de-DE" smtClean="0"/>
-              <a:t>11.12.2022</a:t>
+              <a:t>24.01.2025</a:t>
             </a:fld>
             <a:endParaRPr lang="de-DE"/>
           </a:p>
@@ -2036,7 +2038,7 @@
           <a:p>
             <a:fld id="{311EFB77-D67C-4B41-8660-F7D06438CC8C}" type="datetimeFigureOut">
               <a:rPr lang="de-DE" smtClean="0"/>
-              <a:t>11.12.2022</a:t>
+              <a:t>24.01.2025</a:t>
             </a:fld>
             <a:endParaRPr lang="de-DE"/>
           </a:p>
@@ -2313,7 +2315,7 @@
           <a:p>
             <a:fld id="{311EFB77-D67C-4B41-8660-F7D06438CC8C}" type="datetimeFigureOut">
               <a:rPr lang="de-DE" smtClean="0"/>
-              <a:t>11.12.2022</a:t>
+              <a:t>24.01.2025</a:t>
             </a:fld>
             <a:endParaRPr lang="de-DE"/>
           </a:p>
@@ -2570,7 +2572,7 @@
           <a:p>
             <a:fld id="{311EFB77-D67C-4B41-8660-F7D06438CC8C}" type="datetimeFigureOut">
               <a:rPr lang="de-DE" smtClean="0"/>
-              <a:t>11.12.2022</a:t>
+              <a:t>24.01.2025</a:t>
             </a:fld>
             <a:endParaRPr lang="de-DE"/>
           </a:p>
@@ -2902,7 +2904,7 @@
           <a:p>
             <a:fld id="{311EFB77-D67C-4B41-8660-F7D06438CC8C}" type="datetimeFigureOut">
               <a:rPr lang="de-DE" smtClean="0"/>
-              <a:t>11.12.2022</a:t>
+              <a:t>24.01.2025</a:t>
             </a:fld>
             <a:endParaRPr lang="de-DE"/>
           </a:p>
@@ -43277,7 +43279,13 @@
   <p:cSld>
     <p:spTree>
       <p:nvGrpSpPr>
-        <p:cNvPr id="1" name=""/>
+        <p:cNvPr id="1" name="">
+          <a:extLst>
+            <a:ext uri="{FF2B5EF4-FFF2-40B4-BE49-F238E27FC236}">
+              <a16:creationId xmlns:a16="http://schemas.microsoft.com/office/drawing/2014/main" id="{2892FD4D-6796-1D31-08CF-1C8A8BDA673E}"/>
+            </a:ext>
+          </a:extLst>
+        </p:cNvPr>
         <p:cNvGrpSpPr/>
         <p:nvPr/>
       </p:nvGrpSpPr>
@@ -43291,7 +43299,13 @@
       </p:grpSpPr>
       <p:graphicFrame>
         <p:nvGraphicFramePr>
-          <p:cNvPr id="4" name="Objekt 3" hidden="1"/>
+          <p:cNvPr id="4" name="Objekt 3" hidden="1">
+            <a:extLst>
+              <a:ext uri="{FF2B5EF4-FFF2-40B4-BE49-F238E27FC236}">
+                <a16:creationId xmlns:a16="http://schemas.microsoft.com/office/drawing/2014/main" id="{8F3592E3-FD7C-A61F-9886-C454A00E0C68}"/>
+              </a:ext>
+            </a:extLst>
+          </p:cNvPr>
           <p:cNvGraphicFramePr>
             <a:graphicFrameLocks noChangeAspect="1"/>
           </p:cNvGraphicFramePr>
@@ -43299,11 +43313,6 @@
             <p:custDataLst>
               <p:tags r:id="rId1"/>
             </p:custDataLst>
-            <p:extLst>
-              <p:ext uri="{D42A27DB-BD31-4B8C-83A1-F6EECF244321}">
-                <p14:modId xmlns:p14="http://schemas.microsoft.com/office/powerpoint/2010/main" val="1385730514"/>
-              </p:ext>
-            </p:extLst>
           </p:nvPr>
         </p:nvGraphicFramePr>
         <p:xfrm>
@@ -43323,7 +43332,7 @@
                   <p:embed/>
                   <p:pic>
                     <p:nvPicPr>
-                      <p:cNvPr id="0" name=""/>
+                      <p:cNvPr id="4" name="Objekt 3" hidden="1"/>
                       <p:cNvPicPr/>
                       <p:nvPr/>
                     </p:nvPicPr>
@@ -43351,36 +43360,37 @@
       </p:graphicFrame>
       <p:sp>
         <p:nvSpPr>
-          <p:cNvPr id="5" name="Rechteck 4"/>
-          <p:cNvSpPr>
-            <a:spLocks/>
-          </p:cNvSpPr>
+          <p:cNvPr id="2" name="Rechteck 1">
+            <a:extLst>
+              <a:ext uri="{FF2B5EF4-FFF2-40B4-BE49-F238E27FC236}">
+                <a16:creationId xmlns:a16="http://schemas.microsoft.com/office/drawing/2014/main" id="{8F7B4CA7-B3FE-D619-C711-3567DF757815}"/>
+              </a:ext>
+            </a:extLst>
+          </p:cNvPr>
+          <p:cNvSpPr/>
           <p:nvPr/>
         </p:nvSpPr>
         <p:spPr>
           <a:xfrm>
-            <a:off x="3428009" y="1012277"/>
-            <a:ext cx="3384000" cy="216000"/>
+            <a:off x="4771" y="0"/>
+            <a:ext cx="7194542" cy="7199313"/>
           </a:xfrm>
           <a:prstGeom prst="rect">
             <a:avLst/>
           </a:prstGeom>
           <a:solidFill>
-            <a:schemeClr val="tx1">
-              <a:lumMod val="100000"/>
+            <a:schemeClr val="bg1">
+              <a:alpha val="0"/>
             </a:schemeClr>
           </a:solidFill>
-          <a:ln w="57150" cap="flat" cmpd="sng" algn="ctr">
+          <a:ln>
             <a:noFill/>
-            <a:prstDash val="solid"/>
-            <a:miter lim="800000"/>
           </a:ln>
-          <a:effectLst/>
         </p:spPr>
         <p:style>
           <a:lnRef idx="2">
             <a:schemeClr val="accent1">
-              <a:shade val="50000"/>
+              <a:shade val="15000"/>
             </a:schemeClr>
           </a:lnRef>
           <a:fillRef idx="1">
@@ -43404,24 +43414,30 @@
       </p:sp>
       <p:sp>
         <p:nvSpPr>
-          <p:cNvPr id="6" name="Rechteck 5"/>
-          <p:cNvSpPr/>
+          <p:cNvPr id="5" name="Rechteck 4">
+            <a:extLst>
+              <a:ext uri="{FF2B5EF4-FFF2-40B4-BE49-F238E27FC236}">
+                <a16:creationId xmlns:a16="http://schemas.microsoft.com/office/drawing/2014/main" id="{4DA5FB9F-D325-0434-4DD6-4E5A385D330A}"/>
+              </a:ext>
+            </a:extLst>
+          </p:cNvPr>
+          <p:cNvSpPr>
+            <a:spLocks/>
+          </p:cNvSpPr>
           <p:nvPr/>
         </p:nvSpPr>
         <p:spPr>
           <a:xfrm>
-            <a:off x="291385" y="773137"/>
-            <a:ext cx="1596932" cy="654406"/>
+            <a:off x="4096265" y="956340"/>
+            <a:ext cx="2715744" cy="288000"/>
           </a:xfrm>
           <a:prstGeom prst="rect">
             <a:avLst/>
           </a:prstGeom>
           <a:solidFill>
-            <a:schemeClr val="accent1">
-              <a:lumMod val="75000"/>
-            </a:schemeClr>
+            <a:srgbClr val="808080"/>
           </a:solidFill>
-          <a:ln w="12700" cap="flat" cmpd="sng" algn="ctr">
+          <a:ln w="57150" cap="flat" cmpd="sng" algn="ctr">
             <a:noFill/>
             <a:prstDash val="solid"/>
             <a:miter lim="800000"/>
@@ -43455,17 +43471,84 @@
       </p:sp>
       <p:sp>
         <p:nvSpPr>
-          <p:cNvPr id="7" name="Eingekerbter Richtungspfeil 16"/>
+          <p:cNvPr id="6" name="Rechteck 5">
+            <a:extLst>
+              <a:ext uri="{FF2B5EF4-FFF2-40B4-BE49-F238E27FC236}">
+                <a16:creationId xmlns:a16="http://schemas.microsoft.com/office/drawing/2014/main" id="{3B92D99E-8FA5-635B-6696-C597A2840ADB}"/>
+              </a:ext>
+            </a:extLst>
+          </p:cNvPr>
+          <p:cNvSpPr>
+            <a:spLocks/>
+          </p:cNvSpPr>
+          <p:nvPr/>
+        </p:nvSpPr>
+        <p:spPr>
+          <a:xfrm>
+            <a:off x="291384" y="812340"/>
+            <a:ext cx="2414745" cy="576000"/>
+          </a:xfrm>
+          <a:prstGeom prst="rect">
+            <a:avLst/>
+          </a:prstGeom>
+          <a:solidFill>
+            <a:schemeClr val="accent1">
+              <a:lumMod val="75000"/>
+            </a:schemeClr>
+          </a:solidFill>
+          <a:ln w="12700" cap="flat" cmpd="sng" algn="ctr">
+            <a:noFill/>
+            <a:prstDash val="solid"/>
+            <a:miter lim="800000"/>
+          </a:ln>
+          <a:effectLst/>
+        </p:spPr>
+        <p:style>
+          <a:lnRef idx="2">
+            <a:schemeClr val="accent1">
+              <a:shade val="50000"/>
+            </a:schemeClr>
+          </a:lnRef>
+          <a:fillRef idx="1">
+            <a:schemeClr val="accent1"/>
+          </a:fillRef>
+          <a:effectRef idx="0">
+            <a:schemeClr val="accent1"/>
+          </a:effectRef>
+          <a:fontRef idx="minor">
+            <a:schemeClr val="lt1"/>
+          </a:fontRef>
+        </p:style>
+        <p:txBody>
+          <a:bodyPr rtlCol="0" anchor="ctr"/>
+          <a:lstStyle/>
+          <a:p>
+            <a:pPr algn="ctr"/>
+            <a:endParaRPr lang="en-US" dirty="0"/>
+          </a:p>
+        </p:txBody>
+      </p:sp>
+      <p:sp>
+        <p:nvSpPr>
+          <p:cNvPr id="7" name="Eingekerbter Richtungspfeil 16">
+            <a:extLst>
+              <a:ext uri="{FF2B5EF4-FFF2-40B4-BE49-F238E27FC236}">
+                <a16:creationId xmlns:a16="http://schemas.microsoft.com/office/drawing/2014/main" id="{1B54CC91-B254-694E-4816-1A39517764EB}"/>
+              </a:ext>
+            </a:extLst>
+          </p:cNvPr>
           <p:cNvSpPr/>
           <p:nvPr/>
         </p:nvSpPr>
         <p:spPr>
           <a:xfrm>
-            <a:off x="1183981" y="68884"/>
-            <a:ext cx="1334570" cy="2062912"/>
+            <a:off x="1672073" y="68884"/>
+            <a:ext cx="1800176" cy="2062912"/>
           </a:xfrm>
           <a:prstGeom prst="chevron">
-            <a:avLst/>
+            <a:avLst>
+              <a:gd name="adj" fmla="val 53995"/>
+            </a:avLst>
           </a:prstGeom>
           <a:solidFill>
             <a:schemeClr val="accent1">
@@ -43510,7 +43593,13 @@
       </p:sp>
       <p:sp>
         <p:nvSpPr>
-          <p:cNvPr id="9" name="Rechteck 8"/>
+          <p:cNvPr id="9" name="Rechteck 8">
+            <a:extLst>
+              <a:ext uri="{FF2B5EF4-FFF2-40B4-BE49-F238E27FC236}">
+                <a16:creationId xmlns:a16="http://schemas.microsoft.com/office/drawing/2014/main" id="{DD860FC4-5DAC-25D0-F4CF-C505C06023B1}"/>
+              </a:ext>
+            </a:extLst>
+          </p:cNvPr>
           <p:cNvSpPr>
             <a:spLocks/>
           </p:cNvSpPr>
@@ -43518,16 +43607,14 @@
         </p:nvSpPr>
         <p:spPr>
           <a:xfrm>
-            <a:off x="291385" y="2166877"/>
-            <a:ext cx="6520624" cy="216000"/>
+            <a:off x="291385" y="2792340"/>
+            <a:ext cx="6520624" cy="288000"/>
           </a:xfrm>
           <a:prstGeom prst="rect">
             <a:avLst/>
           </a:prstGeom>
           <a:solidFill>
-            <a:schemeClr val="tx1">
-              <a:lumMod val="100000"/>
-            </a:schemeClr>
+            <a:srgbClr val="808080"/>
           </a:solidFill>
           <a:ln w="57150" cap="flat" cmpd="sng" algn="ctr">
             <a:noFill/>
@@ -43563,7 +43650,13 @@
       </p:sp>
       <p:sp>
         <p:nvSpPr>
-          <p:cNvPr id="10" name="Rechteck 9"/>
+          <p:cNvPr id="10" name="Rechteck 9">
+            <a:extLst>
+              <a:ext uri="{FF2B5EF4-FFF2-40B4-BE49-F238E27FC236}">
+                <a16:creationId xmlns:a16="http://schemas.microsoft.com/office/drawing/2014/main" id="{DC9CE496-F188-BF6F-6E5A-8E4E14246972}"/>
+              </a:ext>
+            </a:extLst>
+          </p:cNvPr>
           <p:cNvSpPr>
             <a:spLocks/>
           </p:cNvSpPr>
@@ -43571,16 +43664,14 @@
         </p:nvSpPr>
         <p:spPr>
           <a:xfrm>
-            <a:off x="291385" y="3321477"/>
-            <a:ext cx="6520624" cy="216000"/>
+            <a:off x="291385" y="4628340"/>
+            <a:ext cx="6520624" cy="288000"/>
           </a:xfrm>
           <a:prstGeom prst="rect">
             <a:avLst/>
           </a:prstGeom>
           <a:solidFill>
-            <a:schemeClr val="tx1">
-              <a:lumMod val="100000"/>
-            </a:schemeClr>
+            <a:srgbClr val="808080"/>
           </a:solidFill>
           <a:ln w="57150" cap="flat" cmpd="sng" algn="ctr">
             <a:noFill/>
@@ -43616,7 +43707,13 @@
       </p:sp>
       <p:sp>
         <p:nvSpPr>
-          <p:cNvPr id="11" name="Rechteck 10"/>
+          <p:cNvPr id="11" name="Rechteck 10">
+            <a:extLst>
+              <a:ext uri="{FF2B5EF4-FFF2-40B4-BE49-F238E27FC236}">
+                <a16:creationId xmlns:a16="http://schemas.microsoft.com/office/drawing/2014/main" id="{A6B44527-00E4-EF66-29D8-CCAB3398008A}"/>
+              </a:ext>
+            </a:extLst>
+          </p:cNvPr>
           <p:cNvSpPr>
             <a:spLocks/>
           </p:cNvSpPr>
@@ -43624,122 +43721,14 @@
         </p:nvSpPr>
         <p:spPr>
           <a:xfrm>
-            <a:off x="291385" y="4476077"/>
-            <a:ext cx="6520624" cy="216000"/>
+            <a:off x="291385" y="6464340"/>
+            <a:ext cx="6520624" cy="288000"/>
           </a:xfrm>
           <a:prstGeom prst="rect">
             <a:avLst/>
           </a:prstGeom>
           <a:solidFill>
-            <a:schemeClr val="tx1">
-              <a:lumMod val="100000"/>
-            </a:schemeClr>
-          </a:solidFill>
-          <a:ln w="57150" cap="flat" cmpd="sng" algn="ctr">
-            <a:noFill/>
-            <a:prstDash val="solid"/>
-            <a:miter lim="800000"/>
-          </a:ln>
-          <a:effectLst/>
-        </p:spPr>
-        <p:style>
-          <a:lnRef idx="2">
-            <a:schemeClr val="accent1">
-              <a:shade val="50000"/>
-            </a:schemeClr>
-          </a:lnRef>
-          <a:fillRef idx="1">
-            <a:schemeClr val="accent1"/>
-          </a:fillRef>
-          <a:effectRef idx="0">
-            <a:schemeClr val="accent1"/>
-          </a:effectRef>
-          <a:fontRef idx="minor">
-            <a:schemeClr val="lt1"/>
-          </a:fontRef>
-        </p:style>
-        <p:txBody>
-          <a:bodyPr rtlCol="0" anchor="ctr"/>
-          <a:lstStyle/>
-          <a:p>
-            <a:pPr algn="ctr"/>
-            <a:endParaRPr lang="en-US"/>
-          </a:p>
-        </p:txBody>
-      </p:sp>
-      <p:sp>
-        <p:nvSpPr>
-          <p:cNvPr id="12" name="Rechteck 11"/>
-          <p:cNvSpPr>
-            <a:spLocks/>
-          </p:cNvSpPr>
-          <p:nvPr/>
-        </p:nvSpPr>
-        <p:spPr>
-          <a:xfrm>
-            <a:off x="291385" y="6785279"/>
-            <a:ext cx="6520624" cy="216000"/>
-          </a:xfrm>
-          <a:prstGeom prst="rect">
-            <a:avLst/>
-          </a:prstGeom>
-          <a:solidFill>
-            <a:schemeClr val="tx1">
-              <a:lumMod val="100000"/>
-            </a:schemeClr>
-          </a:solidFill>
-          <a:ln w="57150" cap="flat" cmpd="sng" algn="ctr">
-            <a:noFill/>
-            <a:prstDash val="solid"/>
-            <a:miter lim="800000"/>
-          </a:ln>
-          <a:effectLst/>
-        </p:spPr>
-        <p:style>
-          <a:lnRef idx="2">
-            <a:schemeClr val="accent1">
-              <a:shade val="50000"/>
-            </a:schemeClr>
-          </a:lnRef>
-          <a:fillRef idx="1">
-            <a:schemeClr val="accent1"/>
-          </a:fillRef>
-          <a:effectRef idx="0">
-            <a:schemeClr val="accent1"/>
-          </a:effectRef>
-          <a:fontRef idx="minor">
-            <a:schemeClr val="lt1"/>
-          </a:fontRef>
-        </p:style>
-        <p:txBody>
-          <a:bodyPr rtlCol="0" anchor="ctr"/>
-          <a:lstStyle/>
-          <a:p>
-            <a:pPr algn="ctr"/>
-            <a:endParaRPr lang="en-US"/>
-          </a:p>
-        </p:txBody>
-      </p:sp>
-      <p:sp>
-        <p:nvSpPr>
-          <p:cNvPr id="13" name="Rechteck 12"/>
-          <p:cNvSpPr>
-            <a:spLocks/>
-          </p:cNvSpPr>
-          <p:nvPr/>
-        </p:nvSpPr>
-        <p:spPr>
-          <a:xfrm>
-            <a:off x="291385" y="5630677"/>
-            <a:ext cx="6520624" cy="216000"/>
-          </a:xfrm>
-          <a:prstGeom prst="rect">
-            <a:avLst/>
-          </a:prstGeom>
-          <a:solidFill>
-            <a:schemeClr val="tx1">
-              <a:lumMod val="100000"/>
-            </a:schemeClr>
+            <a:srgbClr val="808080"/>
           </a:solidFill>
           <a:ln w="57150" cap="flat" cmpd="sng" algn="ctr">
             <a:noFill/>
@@ -43776,7 +43765,7 @@
     </p:spTree>
     <p:extLst>
       <p:ext uri="{BB962C8B-B14F-4D97-AF65-F5344CB8AC3E}">
-        <p14:creationId xmlns:p14="http://schemas.microsoft.com/office/powerpoint/2010/main" val="3270665891"/>
+        <p14:creationId xmlns:p14="http://schemas.microsoft.com/office/powerpoint/2010/main" val="2130455267"/>
       </p:ext>
     </p:extLst>
   </p:cSld>
@@ -43806,6 +43795,923 @@
       <p:graphicFrame>
         <p:nvGraphicFramePr>
           <p:cNvPr id="4" name="Objekt 3" hidden="1"/>
+          <p:cNvGraphicFramePr>
+            <a:graphicFrameLocks noChangeAspect="1"/>
+          </p:cNvGraphicFramePr>
+          <p:nvPr>
+            <p:custDataLst>
+              <p:tags r:id="rId1"/>
+            </p:custDataLst>
+            <p:extLst>
+              <p:ext uri="{D42A27DB-BD31-4B8C-83A1-F6EECF244321}">
+                <p14:modId xmlns:p14="http://schemas.microsoft.com/office/powerpoint/2010/main" val="1073468970"/>
+              </p:ext>
+            </p:extLst>
+          </p:nvPr>
+        </p:nvGraphicFramePr>
+        <p:xfrm>
+          <a:off x="1588" y="1588"/>
+          <a:ext cx="1588" cy="1588"/>
+        </p:xfrm>
+        <a:graphic>
+          <a:graphicData uri="http://schemas.openxmlformats.org/presentationml/2006/ole">
+            <mc:AlternateContent xmlns:mc="http://schemas.openxmlformats.org/markup-compatibility/2006">
+              <mc:Choice xmlns:v="urn:schemas-microsoft-com:vml" Requires="v">
+                <p:oleObj name="think-cell Folie" r:id="rId3" imgW="526" imgH="526" progId="TCLayout.ActiveDocument.1">
+                  <p:embed/>
+                </p:oleObj>
+              </mc:Choice>
+              <mc:Fallback>
+                <p:oleObj name="think-cell Folie" r:id="rId3" imgW="526" imgH="526" progId="TCLayout.ActiveDocument.1">
+                  <p:embed/>
+                  <p:pic>
+                    <p:nvPicPr>
+                      <p:cNvPr id="4" name="Objekt 3" hidden="1"/>
+                      <p:cNvPicPr/>
+                      <p:nvPr/>
+                    </p:nvPicPr>
+                    <p:blipFill>
+                      <a:blip r:embed="rId4"/>
+                      <a:stretch>
+                        <a:fillRect/>
+                      </a:stretch>
+                    </p:blipFill>
+                    <p:spPr>
+                      <a:xfrm>
+                        <a:off x="1588" y="1588"/>
+                        <a:ext cx="1588" cy="1588"/>
+                      </a:xfrm>
+                      <a:prstGeom prst="rect">
+                        <a:avLst/>
+                      </a:prstGeom>
+                    </p:spPr>
+                  </p:pic>
+                </p:oleObj>
+              </mc:Fallback>
+            </mc:AlternateContent>
+          </a:graphicData>
+        </a:graphic>
+      </p:graphicFrame>
+      <p:sp>
+        <p:nvSpPr>
+          <p:cNvPr id="3" name="Rechteck 2">
+            <a:extLst>
+              <a:ext uri="{FF2B5EF4-FFF2-40B4-BE49-F238E27FC236}">
+                <a16:creationId xmlns:a16="http://schemas.microsoft.com/office/drawing/2014/main" id="{2D009BB6-F860-4A87-1204-9F29016CE277}"/>
+              </a:ext>
+            </a:extLst>
+          </p:cNvPr>
+          <p:cNvSpPr/>
+          <p:nvPr/>
+        </p:nvSpPr>
+        <p:spPr>
+          <a:xfrm>
+            <a:off x="4771" y="0"/>
+            <a:ext cx="7194542" cy="7199313"/>
+          </a:xfrm>
+          <a:prstGeom prst="rect">
+            <a:avLst/>
+          </a:prstGeom>
+          <a:solidFill>
+            <a:schemeClr val="bg1">
+              <a:alpha val="0"/>
+            </a:schemeClr>
+          </a:solidFill>
+          <a:ln>
+            <a:noFill/>
+          </a:ln>
+        </p:spPr>
+        <p:style>
+          <a:lnRef idx="2">
+            <a:schemeClr val="accent1">
+              <a:shade val="15000"/>
+            </a:schemeClr>
+          </a:lnRef>
+          <a:fillRef idx="1">
+            <a:schemeClr val="accent1"/>
+          </a:fillRef>
+          <a:effectRef idx="0">
+            <a:schemeClr val="accent1"/>
+          </a:effectRef>
+          <a:fontRef idx="minor">
+            <a:schemeClr val="lt1"/>
+          </a:fontRef>
+        </p:style>
+        <p:txBody>
+          <a:bodyPr rtlCol="0" anchor="ctr"/>
+          <a:lstStyle/>
+          <a:p>
+            <a:pPr algn="ctr"/>
+            <a:endParaRPr lang="en-US"/>
+          </a:p>
+        </p:txBody>
+      </p:sp>
+      <p:sp>
+        <p:nvSpPr>
+          <p:cNvPr id="9" name="Rechteck 8"/>
+          <p:cNvSpPr>
+            <a:spLocks/>
+          </p:cNvSpPr>
+          <p:nvPr/>
+        </p:nvSpPr>
+        <p:spPr>
+          <a:xfrm>
+            <a:off x="339345" y="4040701"/>
+            <a:ext cx="6520624" cy="288000"/>
+          </a:xfrm>
+          <a:prstGeom prst="rect">
+            <a:avLst/>
+          </a:prstGeom>
+          <a:solidFill>
+            <a:srgbClr val="808080"/>
+          </a:solidFill>
+          <a:ln w="57150" cap="flat" cmpd="sng" algn="ctr">
+            <a:noFill/>
+            <a:prstDash val="solid"/>
+            <a:miter lim="800000"/>
+          </a:ln>
+          <a:effectLst/>
+        </p:spPr>
+        <p:style>
+          <a:lnRef idx="2">
+            <a:schemeClr val="accent1">
+              <a:shade val="50000"/>
+            </a:schemeClr>
+          </a:lnRef>
+          <a:fillRef idx="1">
+            <a:schemeClr val="accent1"/>
+          </a:fillRef>
+          <a:effectRef idx="0">
+            <a:schemeClr val="accent1"/>
+          </a:effectRef>
+          <a:fontRef idx="minor">
+            <a:schemeClr val="lt1"/>
+          </a:fontRef>
+        </p:style>
+        <p:txBody>
+          <a:bodyPr rtlCol="0" anchor="ctr"/>
+          <a:lstStyle/>
+          <a:p>
+            <a:pPr algn="ctr"/>
+            <a:endParaRPr lang="en-US"/>
+          </a:p>
+        </p:txBody>
+      </p:sp>
+      <p:sp>
+        <p:nvSpPr>
+          <p:cNvPr id="10" name="Rechteck 9"/>
+          <p:cNvSpPr>
+            <a:spLocks/>
+          </p:cNvSpPr>
+          <p:nvPr/>
+        </p:nvSpPr>
+        <p:spPr>
+          <a:xfrm>
+            <a:off x="339345" y="5336701"/>
+            <a:ext cx="6520624" cy="288000"/>
+          </a:xfrm>
+          <a:prstGeom prst="rect">
+            <a:avLst/>
+          </a:prstGeom>
+          <a:solidFill>
+            <a:srgbClr val="808080"/>
+          </a:solidFill>
+          <a:ln w="57150" cap="flat" cmpd="sng" algn="ctr">
+            <a:noFill/>
+            <a:prstDash val="solid"/>
+            <a:miter lim="800000"/>
+          </a:ln>
+          <a:effectLst/>
+        </p:spPr>
+        <p:style>
+          <a:lnRef idx="2">
+            <a:schemeClr val="accent1">
+              <a:shade val="50000"/>
+            </a:schemeClr>
+          </a:lnRef>
+          <a:fillRef idx="1">
+            <a:schemeClr val="accent1"/>
+          </a:fillRef>
+          <a:effectRef idx="0">
+            <a:schemeClr val="accent1"/>
+          </a:effectRef>
+          <a:fontRef idx="minor">
+            <a:schemeClr val="lt1"/>
+          </a:fontRef>
+        </p:style>
+        <p:txBody>
+          <a:bodyPr rtlCol="0" anchor="ctr"/>
+          <a:lstStyle/>
+          <a:p>
+            <a:pPr algn="ctr"/>
+            <a:endParaRPr lang="en-US"/>
+          </a:p>
+        </p:txBody>
+      </p:sp>
+      <p:sp>
+        <p:nvSpPr>
+          <p:cNvPr id="11" name="Rechteck 10"/>
+          <p:cNvSpPr>
+            <a:spLocks/>
+          </p:cNvSpPr>
+          <p:nvPr/>
+        </p:nvSpPr>
+        <p:spPr>
+          <a:xfrm>
+            <a:off x="339345" y="6632701"/>
+            <a:ext cx="6520624" cy="288000"/>
+          </a:xfrm>
+          <a:prstGeom prst="rect">
+            <a:avLst/>
+          </a:prstGeom>
+          <a:solidFill>
+            <a:srgbClr val="808080"/>
+          </a:solidFill>
+          <a:ln w="57150" cap="flat" cmpd="sng" algn="ctr">
+            <a:noFill/>
+            <a:prstDash val="solid"/>
+            <a:miter lim="800000"/>
+          </a:ln>
+          <a:effectLst/>
+        </p:spPr>
+        <p:style>
+          <a:lnRef idx="2">
+            <a:schemeClr val="accent1">
+              <a:shade val="50000"/>
+            </a:schemeClr>
+          </a:lnRef>
+          <a:fillRef idx="1">
+            <a:schemeClr val="accent1"/>
+          </a:fillRef>
+          <a:effectRef idx="0">
+            <a:schemeClr val="accent1"/>
+          </a:effectRef>
+          <a:fontRef idx="minor">
+            <a:schemeClr val="lt1"/>
+          </a:fontRef>
+        </p:style>
+        <p:txBody>
+          <a:bodyPr rtlCol="0" anchor="ctr"/>
+          <a:lstStyle/>
+          <a:p>
+            <a:pPr algn="ctr"/>
+            <a:endParaRPr lang="en-US"/>
+          </a:p>
+        </p:txBody>
+      </p:sp>
+      <p:grpSp>
+        <p:nvGrpSpPr>
+          <p:cNvPr id="14" name="Gruppieren 13">
+            <a:extLst>
+              <a:ext uri="{FF2B5EF4-FFF2-40B4-BE49-F238E27FC236}">
+                <a16:creationId xmlns:a16="http://schemas.microsoft.com/office/drawing/2014/main" id="{A46588BA-C7F9-6339-42AC-8923CC8B04AC}"/>
+              </a:ext>
+            </a:extLst>
+          </p:cNvPr>
+          <p:cNvGrpSpPr/>
+          <p:nvPr/>
+        </p:nvGrpSpPr>
+        <p:grpSpPr>
+          <a:xfrm rot="5400000">
+            <a:off x="2009224" y="804242"/>
+            <a:ext cx="3180865" cy="2062912"/>
+            <a:chOff x="291384" y="68884"/>
+            <a:chExt cx="3180865" cy="2062912"/>
+          </a:xfrm>
+        </p:grpSpPr>
+        <p:sp>
+          <p:nvSpPr>
+            <p:cNvPr id="5" name="Rechteck 4">
+              <a:extLst>
+                <a:ext uri="{FF2B5EF4-FFF2-40B4-BE49-F238E27FC236}">
+                  <a16:creationId xmlns:a16="http://schemas.microsoft.com/office/drawing/2014/main" id="{7889132B-48AA-4921-4674-E66CD99AFF3C}"/>
+                </a:ext>
+              </a:extLst>
+            </p:cNvPr>
+            <p:cNvSpPr>
+              <a:spLocks/>
+            </p:cNvSpPr>
+            <p:nvPr/>
+          </p:nvSpPr>
+          <p:spPr>
+            <a:xfrm>
+              <a:off x="291384" y="812340"/>
+              <a:ext cx="2414745" cy="576000"/>
+            </a:xfrm>
+            <a:prstGeom prst="rect">
+              <a:avLst/>
+            </a:prstGeom>
+            <a:solidFill>
+              <a:schemeClr val="accent1">
+                <a:lumMod val="75000"/>
+              </a:schemeClr>
+            </a:solidFill>
+            <a:ln w="12700" cap="flat" cmpd="sng" algn="ctr">
+              <a:noFill/>
+              <a:prstDash val="solid"/>
+              <a:miter lim="800000"/>
+            </a:ln>
+            <a:effectLst/>
+          </p:spPr>
+          <p:style>
+            <a:lnRef idx="2">
+              <a:schemeClr val="accent1">
+                <a:shade val="50000"/>
+              </a:schemeClr>
+            </a:lnRef>
+            <a:fillRef idx="1">
+              <a:schemeClr val="accent1"/>
+            </a:fillRef>
+            <a:effectRef idx="0">
+              <a:schemeClr val="accent1"/>
+            </a:effectRef>
+            <a:fontRef idx="minor">
+              <a:schemeClr val="lt1"/>
+            </a:fontRef>
+          </p:style>
+          <p:txBody>
+            <a:bodyPr rtlCol="0" anchor="ctr"/>
+            <a:lstStyle/>
+            <a:p>
+              <a:pPr algn="ctr"/>
+              <a:endParaRPr lang="en-US" dirty="0"/>
+            </a:p>
+          </p:txBody>
+        </p:sp>
+        <p:sp>
+          <p:nvSpPr>
+            <p:cNvPr id="8" name="Eingekerbter Richtungspfeil 16">
+              <a:extLst>
+                <a:ext uri="{FF2B5EF4-FFF2-40B4-BE49-F238E27FC236}">
+                  <a16:creationId xmlns:a16="http://schemas.microsoft.com/office/drawing/2014/main" id="{53C27B88-26AF-BAE8-7A90-677CAD6ED17D}"/>
+                </a:ext>
+              </a:extLst>
+            </p:cNvPr>
+            <p:cNvSpPr/>
+            <p:nvPr/>
+          </p:nvSpPr>
+          <p:spPr>
+            <a:xfrm>
+              <a:off x="1672073" y="68884"/>
+              <a:ext cx="1800176" cy="2062912"/>
+            </a:xfrm>
+            <a:prstGeom prst="chevron">
+              <a:avLst>
+                <a:gd name="adj" fmla="val 53995"/>
+              </a:avLst>
+            </a:prstGeom>
+            <a:solidFill>
+              <a:schemeClr val="accent1">
+                <a:lumMod val="75000"/>
+              </a:schemeClr>
+            </a:solidFill>
+            <a:ln w="12700" cap="flat" cmpd="sng" algn="ctr">
+              <a:noFill/>
+              <a:prstDash val="solid"/>
+              <a:miter lim="800000"/>
+            </a:ln>
+            <a:effectLst/>
+          </p:spPr>
+          <p:style>
+            <a:lnRef idx="2">
+              <a:schemeClr val="accent1">
+                <a:shade val="50000"/>
+              </a:schemeClr>
+            </a:lnRef>
+            <a:fillRef idx="1">
+              <a:schemeClr val="accent1"/>
+            </a:fillRef>
+            <a:effectRef idx="0">
+              <a:schemeClr val="accent1"/>
+            </a:effectRef>
+            <a:fontRef idx="minor">
+              <a:schemeClr val="lt1"/>
+            </a:fontRef>
+          </p:style>
+          <p:txBody>
+            <a:bodyPr rtlCol="0" anchor="ctr"/>
+            <a:lstStyle/>
+            <a:p>
+              <a:pPr algn="ctr"/>
+              <a:endParaRPr lang="en-US">
+                <a:solidFill>
+                  <a:schemeClr val="tx1"/>
+                </a:solidFill>
+              </a:endParaRPr>
+            </a:p>
+          </p:txBody>
+        </p:sp>
+      </p:grpSp>
+    </p:spTree>
+    <p:extLst>
+      <p:ext uri="{BB962C8B-B14F-4D97-AF65-F5344CB8AC3E}">
+        <p14:creationId xmlns:p14="http://schemas.microsoft.com/office/powerpoint/2010/main" val="2339647210"/>
+      </p:ext>
+    </p:extLst>
+  </p:cSld>
+  <p:clrMapOvr>
+    <a:masterClrMapping/>
+  </p:clrMapOvr>
+</p:sld>
+</file>
+
+<file path=ppt/slides/slide95.xml><?xml version="1.0" encoding="utf-8"?>
+<p:sld xmlns:a="http://schemas.openxmlformats.org/drawingml/2006/main" xmlns:r="http://schemas.openxmlformats.org/officeDocument/2006/relationships" xmlns:p="http://schemas.openxmlformats.org/presentationml/2006/main">
+  <p:cSld>
+    <p:spTree>
+      <p:nvGrpSpPr>
+        <p:cNvPr id="1" name="">
+          <a:extLst>
+            <a:ext uri="{FF2B5EF4-FFF2-40B4-BE49-F238E27FC236}">
+              <a16:creationId xmlns:a16="http://schemas.microsoft.com/office/drawing/2014/main" id="{119C5832-8489-5303-649A-9CE8078FEAA7}"/>
+            </a:ext>
+          </a:extLst>
+        </p:cNvPr>
+        <p:cNvGrpSpPr/>
+        <p:nvPr/>
+      </p:nvGrpSpPr>
+      <p:grpSpPr>
+        <a:xfrm>
+          <a:off x="0" y="0"/>
+          <a:ext cx="0" cy="0"/>
+          <a:chOff x="0" y="0"/>
+          <a:chExt cx="0" cy="0"/>
+        </a:xfrm>
+      </p:grpSpPr>
+      <p:graphicFrame>
+        <p:nvGraphicFramePr>
+          <p:cNvPr id="4" name="Objekt 3" hidden="1">
+            <a:extLst>
+              <a:ext uri="{FF2B5EF4-FFF2-40B4-BE49-F238E27FC236}">
+                <a16:creationId xmlns:a16="http://schemas.microsoft.com/office/drawing/2014/main" id="{F87C0A9C-587E-B3B3-7831-DEEC4E59AFC3}"/>
+              </a:ext>
+            </a:extLst>
+          </p:cNvPr>
+          <p:cNvGraphicFramePr>
+            <a:graphicFrameLocks noChangeAspect="1"/>
+          </p:cNvGraphicFramePr>
+          <p:nvPr>
+            <p:custDataLst>
+              <p:tags r:id="rId1"/>
+            </p:custDataLst>
+          </p:nvPr>
+        </p:nvGraphicFramePr>
+        <p:xfrm>
+          <a:off x="1588" y="1588"/>
+          <a:ext cx="1588" cy="1588"/>
+        </p:xfrm>
+        <a:graphic>
+          <a:graphicData uri="http://schemas.openxmlformats.org/presentationml/2006/ole">
+            <mc:AlternateContent xmlns:mc="http://schemas.openxmlformats.org/markup-compatibility/2006">
+              <mc:Choice xmlns:v="urn:schemas-microsoft-com:vml" Requires="v">
+                <p:oleObj name="think-cell Folie" r:id="rId3" imgW="526" imgH="526" progId="TCLayout.ActiveDocument.1">
+                  <p:embed/>
+                </p:oleObj>
+              </mc:Choice>
+              <mc:Fallback>
+                <p:oleObj name="think-cell Folie" r:id="rId3" imgW="526" imgH="526" progId="TCLayout.ActiveDocument.1">
+                  <p:embed/>
+                  <p:pic>
+                    <p:nvPicPr>
+                      <p:cNvPr id="4" name="Objekt 3" hidden="1"/>
+                      <p:cNvPicPr/>
+                      <p:nvPr/>
+                    </p:nvPicPr>
+                    <p:blipFill>
+                      <a:blip r:embed="rId4"/>
+                      <a:stretch>
+                        <a:fillRect/>
+                      </a:stretch>
+                    </p:blipFill>
+                    <p:spPr>
+                      <a:xfrm>
+                        <a:off x="1588" y="1588"/>
+                        <a:ext cx="1588" cy="1588"/>
+                      </a:xfrm>
+                      <a:prstGeom prst="rect">
+                        <a:avLst/>
+                      </a:prstGeom>
+                    </p:spPr>
+                  </p:pic>
+                </p:oleObj>
+              </mc:Fallback>
+            </mc:AlternateContent>
+          </a:graphicData>
+        </a:graphic>
+      </p:graphicFrame>
+      <p:sp>
+        <p:nvSpPr>
+          <p:cNvPr id="3" name="Rechteck 2">
+            <a:extLst>
+              <a:ext uri="{FF2B5EF4-FFF2-40B4-BE49-F238E27FC236}">
+                <a16:creationId xmlns:a16="http://schemas.microsoft.com/office/drawing/2014/main" id="{AF3468C5-F87A-6CD4-6DAA-3BF9BC2F3977}"/>
+              </a:ext>
+            </a:extLst>
+          </p:cNvPr>
+          <p:cNvSpPr/>
+          <p:nvPr/>
+        </p:nvSpPr>
+        <p:spPr>
+          <a:xfrm>
+            <a:off x="4771" y="0"/>
+            <a:ext cx="7194542" cy="7199313"/>
+          </a:xfrm>
+          <a:prstGeom prst="rect">
+            <a:avLst/>
+          </a:prstGeom>
+          <a:solidFill>
+            <a:schemeClr val="bg1">
+              <a:alpha val="0"/>
+            </a:schemeClr>
+          </a:solidFill>
+          <a:ln>
+            <a:noFill/>
+          </a:ln>
+        </p:spPr>
+        <p:style>
+          <a:lnRef idx="2">
+            <a:schemeClr val="accent1">
+              <a:shade val="15000"/>
+            </a:schemeClr>
+          </a:lnRef>
+          <a:fillRef idx="1">
+            <a:schemeClr val="accent1"/>
+          </a:fillRef>
+          <a:effectRef idx="0">
+            <a:schemeClr val="accent1"/>
+          </a:effectRef>
+          <a:fontRef idx="minor">
+            <a:schemeClr val="lt1"/>
+          </a:fontRef>
+        </p:style>
+        <p:txBody>
+          <a:bodyPr rtlCol="0" anchor="ctr"/>
+          <a:lstStyle/>
+          <a:p>
+            <a:pPr algn="ctr"/>
+            <a:endParaRPr lang="en-US"/>
+          </a:p>
+        </p:txBody>
+      </p:sp>
+      <p:sp>
+        <p:nvSpPr>
+          <p:cNvPr id="9" name="Rechteck 8">
+            <a:extLst>
+              <a:ext uri="{FF2B5EF4-FFF2-40B4-BE49-F238E27FC236}">
+                <a16:creationId xmlns:a16="http://schemas.microsoft.com/office/drawing/2014/main" id="{A8F625F4-416C-6C94-3279-275E4C92B33D}"/>
+              </a:ext>
+            </a:extLst>
+          </p:cNvPr>
+          <p:cNvSpPr>
+            <a:spLocks/>
+          </p:cNvSpPr>
+          <p:nvPr/>
+        </p:nvSpPr>
+        <p:spPr>
+          <a:xfrm>
+            <a:off x="339345" y="344444"/>
+            <a:ext cx="6520624" cy="288000"/>
+          </a:xfrm>
+          <a:prstGeom prst="rect">
+            <a:avLst/>
+          </a:prstGeom>
+          <a:solidFill>
+            <a:srgbClr val="808080"/>
+          </a:solidFill>
+          <a:ln w="57150" cap="flat" cmpd="sng" algn="ctr">
+            <a:noFill/>
+            <a:prstDash val="solid"/>
+            <a:miter lim="800000"/>
+          </a:ln>
+          <a:effectLst/>
+        </p:spPr>
+        <p:style>
+          <a:lnRef idx="2">
+            <a:schemeClr val="accent1">
+              <a:shade val="50000"/>
+            </a:schemeClr>
+          </a:lnRef>
+          <a:fillRef idx="1">
+            <a:schemeClr val="accent1"/>
+          </a:fillRef>
+          <a:effectRef idx="0">
+            <a:schemeClr val="accent1"/>
+          </a:effectRef>
+          <a:fontRef idx="minor">
+            <a:schemeClr val="lt1"/>
+          </a:fontRef>
+        </p:style>
+        <p:txBody>
+          <a:bodyPr rtlCol="0" anchor="ctr"/>
+          <a:lstStyle/>
+          <a:p>
+            <a:pPr algn="ctr"/>
+            <a:endParaRPr lang="en-US"/>
+          </a:p>
+        </p:txBody>
+      </p:sp>
+      <p:sp>
+        <p:nvSpPr>
+          <p:cNvPr id="10" name="Rechteck 9">
+            <a:extLst>
+              <a:ext uri="{FF2B5EF4-FFF2-40B4-BE49-F238E27FC236}">
+                <a16:creationId xmlns:a16="http://schemas.microsoft.com/office/drawing/2014/main" id="{D4D76F9A-F1E5-EEF3-256C-4C11E2DE656E}"/>
+              </a:ext>
+            </a:extLst>
+          </p:cNvPr>
+          <p:cNvSpPr>
+            <a:spLocks/>
+          </p:cNvSpPr>
+          <p:nvPr/>
+        </p:nvSpPr>
+        <p:spPr>
+          <a:xfrm>
+            <a:off x="339345" y="1640444"/>
+            <a:ext cx="6520624" cy="288000"/>
+          </a:xfrm>
+          <a:prstGeom prst="rect">
+            <a:avLst/>
+          </a:prstGeom>
+          <a:solidFill>
+            <a:srgbClr val="808080"/>
+          </a:solidFill>
+          <a:ln w="57150" cap="flat" cmpd="sng" algn="ctr">
+            <a:noFill/>
+            <a:prstDash val="solid"/>
+            <a:miter lim="800000"/>
+          </a:ln>
+          <a:effectLst/>
+        </p:spPr>
+        <p:style>
+          <a:lnRef idx="2">
+            <a:schemeClr val="accent1">
+              <a:shade val="50000"/>
+            </a:schemeClr>
+          </a:lnRef>
+          <a:fillRef idx="1">
+            <a:schemeClr val="accent1"/>
+          </a:fillRef>
+          <a:effectRef idx="0">
+            <a:schemeClr val="accent1"/>
+          </a:effectRef>
+          <a:fontRef idx="minor">
+            <a:schemeClr val="lt1"/>
+          </a:fontRef>
+        </p:style>
+        <p:txBody>
+          <a:bodyPr rtlCol="0" anchor="ctr"/>
+          <a:lstStyle/>
+          <a:p>
+            <a:pPr algn="ctr"/>
+            <a:endParaRPr lang="en-US"/>
+          </a:p>
+        </p:txBody>
+      </p:sp>
+      <p:sp>
+        <p:nvSpPr>
+          <p:cNvPr id="11" name="Rechteck 10">
+            <a:extLst>
+              <a:ext uri="{FF2B5EF4-FFF2-40B4-BE49-F238E27FC236}">
+                <a16:creationId xmlns:a16="http://schemas.microsoft.com/office/drawing/2014/main" id="{BF391696-5AE0-6119-D7B2-2C01B9576037}"/>
+              </a:ext>
+            </a:extLst>
+          </p:cNvPr>
+          <p:cNvSpPr>
+            <a:spLocks/>
+          </p:cNvSpPr>
+          <p:nvPr/>
+        </p:nvSpPr>
+        <p:spPr>
+          <a:xfrm>
+            <a:off x="339345" y="2936444"/>
+            <a:ext cx="6520624" cy="288000"/>
+          </a:xfrm>
+          <a:prstGeom prst="rect">
+            <a:avLst/>
+          </a:prstGeom>
+          <a:solidFill>
+            <a:srgbClr val="808080"/>
+          </a:solidFill>
+          <a:ln w="57150" cap="flat" cmpd="sng" algn="ctr">
+            <a:noFill/>
+            <a:prstDash val="solid"/>
+            <a:miter lim="800000"/>
+          </a:ln>
+          <a:effectLst/>
+        </p:spPr>
+        <p:style>
+          <a:lnRef idx="2">
+            <a:schemeClr val="accent1">
+              <a:shade val="50000"/>
+            </a:schemeClr>
+          </a:lnRef>
+          <a:fillRef idx="1">
+            <a:schemeClr val="accent1"/>
+          </a:fillRef>
+          <a:effectRef idx="0">
+            <a:schemeClr val="accent1"/>
+          </a:effectRef>
+          <a:fontRef idx="minor">
+            <a:schemeClr val="lt1"/>
+          </a:fontRef>
+        </p:style>
+        <p:txBody>
+          <a:bodyPr rtlCol="0" anchor="ctr"/>
+          <a:lstStyle/>
+          <a:p>
+            <a:pPr algn="ctr"/>
+            <a:endParaRPr lang="en-US"/>
+          </a:p>
+        </p:txBody>
+      </p:sp>
+      <p:grpSp>
+        <p:nvGrpSpPr>
+          <p:cNvPr id="14" name="Gruppieren 13">
+            <a:extLst>
+              <a:ext uri="{FF2B5EF4-FFF2-40B4-BE49-F238E27FC236}">
+                <a16:creationId xmlns:a16="http://schemas.microsoft.com/office/drawing/2014/main" id="{B0718681-8836-BF43-CAE0-7FD3279DA5B3}"/>
+              </a:ext>
+            </a:extLst>
+          </p:cNvPr>
+          <p:cNvGrpSpPr/>
+          <p:nvPr/>
+        </p:nvGrpSpPr>
+        <p:grpSpPr>
+          <a:xfrm rot="5400000">
+            <a:off x="2009224" y="4305245"/>
+            <a:ext cx="3180865" cy="2062912"/>
+            <a:chOff x="291384" y="68884"/>
+            <a:chExt cx="3180865" cy="2062912"/>
+          </a:xfrm>
+        </p:grpSpPr>
+        <p:sp>
+          <p:nvSpPr>
+            <p:cNvPr id="5" name="Rechteck 4">
+              <a:extLst>
+                <a:ext uri="{FF2B5EF4-FFF2-40B4-BE49-F238E27FC236}">
+                  <a16:creationId xmlns:a16="http://schemas.microsoft.com/office/drawing/2014/main" id="{6FF0F233-F2FA-4B42-A1CB-89DD1B1BC8FA}"/>
+                </a:ext>
+              </a:extLst>
+            </p:cNvPr>
+            <p:cNvSpPr>
+              <a:spLocks/>
+            </p:cNvSpPr>
+            <p:nvPr/>
+          </p:nvSpPr>
+          <p:spPr>
+            <a:xfrm>
+              <a:off x="291384" y="812340"/>
+              <a:ext cx="2414745" cy="576000"/>
+            </a:xfrm>
+            <a:prstGeom prst="rect">
+              <a:avLst/>
+            </a:prstGeom>
+            <a:solidFill>
+              <a:schemeClr val="accent1">
+                <a:lumMod val="75000"/>
+              </a:schemeClr>
+            </a:solidFill>
+            <a:ln w="12700" cap="flat" cmpd="sng" algn="ctr">
+              <a:noFill/>
+              <a:prstDash val="solid"/>
+              <a:miter lim="800000"/>
+            </a:ln>
+            <a:effectLst/>
+          </p:spPr>
+          <p:style>
+            <a:lnRef idx="2">
+              <a:schemeClr val="accent1">
+                <a:shade val="50000"/>
+              </a:schemeClr>
+            </a:lnRef>
+            <a:fillRef idx="1">
+              <a:schemeClr val="accent1"/>
+            </a:fillRef>
+            <a:effectRef idx="0">
+              <a:schemeClr val="accent1"/>
+            </a:effectRef>
+            <a:fontRef idx="minor">
+              <a:schemeClr val="lt1"/>
+            </a:fontRef>
+          </p:style>
+          <p:txBody>
+            <a:bodyPr rtlCol="0" anchor="ctr"/>
+            <a:lstStyle/>
+            <a:p>
+              <a:pPr algn="ctr"/>
+              <a:endParaRPr lang="en-US" dirty="0"/>
+            </a:p>
+          </p:txBody>
+        </p:sp>
+        <p:sp>
+          <p:nvSpPr>
+            <p:cNvPr id="8" name="Eingekerbter Richtungspfeil 16">
+              <a:extLst>
+                <a:ext uri="{FF2B5EF4-FFF2-40B4-BE49-F238E27FC236}">
+                  <a16:creationId xmlns:a16="http://schemas.microsoft.com/office/drawing/2014/main" id="{5674ECE9-347C-43DC-90AD-B79DDBF979A2}"/>
+                </a:ext>
+              </a:extLst>
+            </p:cNvPr>
+            <p:cNvSpPr/>
+            <p:nvPr/>
+          </p:nvSpPr>
+          <p:spPr>
+            <a:xfrm>
+              <a:off x="1672073" y="68884"/>
+              <a:ext cx="1800176" cy="2062912"/>
+            </a:xfrm>
+            <a:prstGeom prst="chevron">
+              <a:avLst>
+                <a:gd name="adj" fmla="val 53995"/>
+              </a:avLst>
+            </a:prstGeom>
+            <a:solidFill>
+              <a:schemeClr val="accent1">
+                <a:lumMod val="75000"/>
+              </a:schemeClr>
+            </a:solidFill>
+            <a:ln w="12700" cap="flat" cmpd="sng" algn="ctr">
+              <a:noFill/>
+              <a:prstDash val="solid"/>
+              <a:miter lim="800000"/>
+            </a:ln>
+            <a:effectLst/>
+          </p:spPr>
+          <p:style>
+            <a:lnRef idx="2">
+              <a:schemeClr val="accent1">
+                <a:shade val="50000"/>
+              </a:schemeClr>
+            </a:lnRef>
+            <a:fillRef idx="1">
+              <a:schemeClr val="accent1"/>
+            </a:fillRef>
+            <a:effectRef idx="0">
+              <a:schemeClr val="accent1"/>
+            </a:effectRef>
+            <a:fontRef idx="minor">
+              <a:schemeClr val="lt1"/>
+            </a:fontRef>
+          </p:style>
+          <p:txBody>
+            <a:bodyPr rtlCol="0" anchor="ctr"/>
+            <a:lstStyle/>
+            <a:p>
+              <a:pPr algn="ctr"/>
+              <a:endParaRPr lang="en-US">
+                <a:solidFill>
+                  <a:schemeClr val="tx1"/>
+                </a:solidFill>
+              </a:endParaRPr>
+            </a:p>
+          </p:txBody>
+        </p:sp>
+      </p:grpSp>
+    </p:spTree>
+    <p:extLst>
+      <p:ext uri="{BB962C8B-B14F-4D97-AF65-F5344CB8AC3E}">
+        <p14:creationId xmlns:p14="http://schemas.microsoft.com/office/powerpoint/2010/main" val="4074864638"/>
+      </p:ext>
+    </p:extLst>
+  </p:cSld>
+  <p:clrMapOvr>
+    <a:masterClrMapping/>
+  </p:clrMapOvr>
+</p:sld>
+</file>
+
+<file path=ppt/slides/slide96.xml><?xml version="1.0" encoding="utf-8"?>
+<p:sld xmlns:a="http://schemas.openxmlformats.org/drawingml/2006/main" xmlns:r="http://schemas.openxmlformats.org/officeDocument/2006/relationships" xmlns:p="http://schemas.openxmlformats.org/presentationml/2006/main">
+  <p:cSld>
+    <p:spTree>
+      <p:nvGrpSpPr>
+        <p:cNvPr id="1" name="">
+          <a:extLst>
+            <a:ext uri="{FF2B5EF4-FFF2-40B4-BE49-F238E27FC236}">
+              <a16:creationId xmlns:a16="http://schemas.microsoft.com/office/drawing/2014/main" id="{9536A4A6-B6A7-FA47-A109-D7188A043C3D}"/>
+            </a:ext>
+          </a:extLst>
+        </p:cNvPr>
+        <p:cNvGrpSpPr/>
+        <p:nvPr/>
+      </p:nvGrpSpPr>
+      <p:grpSpPr>
+        <a:xfrm>
+          <a:off x="0" y="0"/>
+          <a:ext cx="0" cy="0"/>
+          <a:chOff x="0" y="0"/>
+          <a:chExt cx="0" cy="0"/>
+        </a:xfrm>
+      </p:grpSpPr>
+      <p:graphicFrame>
+        <p:nvGraphicFramePr>
+          <p:cNvPr id="4" name="Objekt 3" hidden="1">
+            <a:extLst>
+              <a:ext uri="{FF2B5EF4-FFF2-40B4-BE49-F238E27FC236}">
+                <a16:creationId xmlns:a16="http://schemas.microsoft.com/office/drawing/2014/main" id="{B8EF43C6-583E-BD16-7550-5A1E1894F60E}"/>
+              </a:ext>
+            </a:extLst>
+          </p:cNvPr>
           <p:cNvGraphicFramePr>
             <a:graphicFrameLocks noChangeAspect="1"/>
           </p:cNvGraphicFramePr>
@@ -43860,7 +44766,13 @@
       </p:graphicFrame>
       <p:grpSp>
         <p:nvGrpSpPr>
-          <p:cNvPr id="2" name="Gruppieren 1"/>
+          <p:cNvPr id="2" name="Gruppieren 1">
+            <a:extLst>
+              <a:ext uri="{FF2B5EF4-FFF2-40B4-BE49-F238E27FC236}">
+                <a16:creationId xmlns:a16="http://schemas.microsoft.com/office/drawing/2014/main" id="{01B76726-28AB-2853-9790-9098AFC6B802}"/>
+              </a:ext>
+            </a:extLst>
+          </p:cNvPr>
           <p:cNvGrpSpPr/>
           <p:nvPr/>
         </p:nvGrpSpPr>
@@ -43874,7 +44786,13 @@
         </p:grpSpPr>
         <p:sp>
           <p:nvSpPr>
-            <p:cNvPr id="6" name="Rechteck 5"/>
+            <p:cNvPr id="6" name="Rechteck 5">
+              <a:extLst>
+                <a:ext uri="{FF2B5EF4-FFF2-40B4-BE49-F238E27FC236}">
+                  <a16:creationId xmlns:a16="http://schemas.microsoft.com/office/drawing/2014/main" id="{C6241164-C78B-F030-167D-9AE502BA58DA}"/>
+                </a:ext>
+              </a:extLst>
+            </p:cNvPr>
             <p:cNvSpPr/>
             <p:nvPr/>
           </p:nvSpPr>
@@ -43925,7 +44843,13 @@
         </p:sp>
         <p:sp>
           <p:nvSpPr>
-            <p:cNvPr id="7" name="Eingekerbter Richtungspfeil 16"/>
+            <p:cNvPr id="7" name="Eingekerbter Richtungspfeil 16">
+              <a:extLst>
+                <a:ext uri="{FF2B5EF4-FFF2-40B4-BE49-F238E27FC236}">
+                  <a16:creationId xmlns:a16="http://schemas.microsoft.com/office/drawing/2014/main" id="{49247139-FF04-C1DC-FB71-EC572BCF775D}"/>
+                </a:ext>
+              </a:extLst>
+            </p:cNvPr>
             <p:cNvSpPr/>
             <p:nvPr/>
           </p:nvSpPr>
@@ -43981,7 +44905,13 @@
       </p:grpSp>
       <p:sp>
         <p:nvSpPr>
-          <p:cNvPr id="9" name="Rechteck 8"/>
+          <p:cNvPr id="9" name="Rechteck 8">
+            <a:extLst>
+              <a:ext uri="{FF2B5EF4-FFF2-40B4-BE49-F238E27FC236}">
+                <a16:creationId xmlns:a16="http://schemas.microsoft.com/office/drawing/2014/main" id="{410B1241-E2BA-8258-7F83-2C9125CF6D1D}"/>
+              </a:ext>
+            </a:extLst>
+          </p:cNvPr>
           <p:cNvSpPr>
             <a:spLocks/>
           </p:cNvSpPr>
@@ -44034,7 +44964,13 @@
       </p:sp>
       <p:sp>
         <p:nvSpPr>
-          <p:cNvPr id="10" name="Rechteck 9"/>
+          <p:cNvPr id="10" name="Rechteck 9">
+            <a:extLst>
+              <a:ext uri="{FF2B5EF4-FFF2-40B4-BE49-F238E27FC236}">
+                <a16:creationId xmlns:a16="http://schemas.microsoft.com/office/drawing/2014/main" id="{74165ED1-F31D-E1E2-B85F-3EB2F03D6B97}"/>
+              </a:ext>
+            </a:extLst>
+          </p:cNvPr>
           <p:cNvSpPr>
             <a:spLocks/>
           </p:cNvSpPr>
@@ -44087,7 +45023,13 @@
       </p:sp>
       <p:sp>
         <p:nvSpPr>
-          <p:cNvPr id="11" name="Rechteck 10"/>
+          <p:cNvPr id="11" name="Rechteck 10">
+            <a:extLst>
+              <a:ext uri="{FF2B5EF4-FFF2-40B4-BE49-F238E27FC236}">
+                <a16:creationId xmlns:a16="http://schemas.microsoft.com/office/drawing/2014/main" id="{706D8E49-4EFE-38F8-55C3-17C7AE6E6AA3}"/>
+              </a:ext>
+            </a:extLst>
+          </p:cNvPr>
           <p:cNvSpPr>
             <a:spLocks/>
           </p:cNvSpPr>
@@ -44140,7 +45082,13 @@
       </p:sp>
       <p:sp>
         <p:nvSpPr>
-          <p:cNvPr id="12" name="Rechteck 11"/>
+          <p:cNvPr id="12" name="Rechteck 11">
+            <a:extLst>
+              <a:ext uri="{FF2B5EF4-FFF2-40B4-BE49-F238E27FC236}">
+                <a16:creationId xmlns:a16="http://schemas.microsoft.com/office/drawing/2014/main" id="{AE1FAEEC-86F2-D648-2CEF-69417FD2541E}"/>
+              </a:ext>
+            </a:extLst>
+          </p:cNvPr>
           <p:cNvSpPr>
             <a:spLocks/>
           </p:cNvSpPr>
@@ -44193,7 +45141,13 @@
       </p:sp>
       <p:sp>
         <p:nvSpPr>
-          <p:cNvPr id="13" name="Rechteck 12"/>
+          <p:cNvPr id="13" name="Rechteck 12">
+            <a:extLst>
+              <a:ext uri="{FF2B5EF4-FFF2-40B4-BE49-F238E27FC236}">
+                <a16:creationId xmlns:a16="http://schemas.microsoft.com/office/drawing/2014/main" id="{11709D3E-188C-D7D5-756A-AFF86B6723BF}"/>
+              </a:ext>
+            </a:extLst>
+          </p:cNvPr>
           <p:cNvSpPr>
             <a:spLocks/>
           </p:cNvSpPr>
@@ -44247,7 +45201,7 @@
     </p:spTree>
     <p:extLst>
       <p:ext uri="{BB962C8B-B14F-4D97-AF65-F5344CB8AC3E}">
-        <p14:creationId xmlns:p14="http://schemas.microsoft.com/office/powerpoint/2010/main" val="2339647210"/>
+        <p14:creationId xmlns:p14="http://schemas.microsoft.com/office/powerpoint/2010/main" val="2600523922"/>
       </p:ext>
     </p:extLst>
   </p:cSld>
@@ -44257,7 +45211,7 @@
 </p:sld>
 </file>
 
-<file path=ppt/slides/slide95.xml><?xml version="1.0" encoding="utf-8"?>
+<file path=ppt/slides/slide97.xml><?xml version="1.0" encoding="utf-8"?>
 <p:sld xmlns:a="http://schemas.openxmlformats.org/drawingml/2006/main" xmlns:r="http://schemas.openxmlformats.org/officeDocument/2006/relationships" xmlns:p="http://schemas.openxmlformats.org/presentationml/2006/main">
   <p:cSld>
     <p:spTree>
@@ -45285,6 +46239,18 @@
 </p:tagLst>
 </file>
 
+<file path=ppt/tags/tag87.xml><?xml version="1.0" encoding="utf-8"?>
+<p:tagLst xmlns:a="http://schemas.openxmlformats.org/drawingml/2006/main" xmlns:r="http://schemas.openxmlformats.org/officeDocument/2006/relationships" xmlns:p="http://schemas.openxmlformats.org/presentationml/2006/main">
+  <p:tag name="THINKCELLSHAPEDONOTDELETE" val="thinkcellActiveDocDoNotDelete"/>
+</p:tagLst>
+</file>
+
+<file path=ppt/tags/tag88.xml><?xml version="1.0" encoding="utf-8"?>
+<p:tagLst xmlns:a="http://schemas.openxmlformats.org/drawingml/2006/main" xmlns:r="http://schemas.openxmlformats.org/officeDocument/2006/relationships" xmlns:p="http://schemas.openxmlformats.org/presentationml/2006/main">
+  <p:tag name="THINKCELLSHAPEDONOTDELETE" val="thinkcellActiveDocDoNotDelete"/>
+</p:tagLst>
+</file>
+
 <file path=ppt/tags/tag9.xml><?xml version="1.0" encoding="utf-8"?>
 <p:tagLst xmlns:a="http://schemas.openxmlformats.org/drawingml/2006/main" xmlns:r="http://schemas.openxmlformats.org/officeDocument/2006/relationships" xmlns:p="http://schemas.openxmlformats.org/presentationml/2006/main">
   <p:tag name="THINKCELLSHAPEDONOTDELETE" val="thinkcellActiveDocDoNotDelete"/>

</xml_diff>